<commit_message>
Added no pictures graphic
</commit_message>
<xml_diff>
--- a/oxford/Oxford_2019.pptx
+++ b/oxford/Oxford_2019.pptx
@@ -164,7 +164,7 @@
 <file path=ppt/revisionInfo.xml><?xml version="1.0" encoding="utf-8"?>
 <p1510:revInfo xmlns:a="http://schemas.openxmlformats.org/drawingml/2006/main" xmlns:r="http://schemas.openxmlformats.org/officeDocument/2006/relationships" xmlns:p1510="http://schemas.microsoft.com/office/powerpoint/2015/10/main">
   <p1510:revLst>
-    <p1510:client id="{D2CBAF8C-0DC0-434D-AC50-CC354D962A53}" v="11481" dt="2019-11-01T11:20:22.530"/>
+    <p1510:client id="{D2CBAF8C-0DC0-434D-AC50-CC354D962A53}" v="11482" dt="2019-11-01T12:14:28.127"/>
   </p1510:revLst>
 </p1510:revInfo>
 </file>
@@ -174,12 +174,12 @@
   <pc:docChgLst>
     <pc:chgData name="Fabian Wosar" userId="f59eda9b-2093-4b17-b2e8-c9fbc41c9cab" providerId="ADAL" clId="{D2CBAF8C-0DC0-434D-AC50-CC354D962A53}"/>
     <pc:docChg chg="undo custSel mod addSld delSld modSld sldOrd">
-      <pc:chgData name="Fabian Wosar" userId="f59eda9b-2093-4b17-b2e8-c9fbc41c9cab" providerId="ADAL" clId="{D2CBAF8C-0DC0-434D-AC50-CC354D962A53}" dt="2019-11-01T11:20:22.530" v="13269" actId="20577"/>
+      <pc:chgData name="Fabian Wosar" userId="f59eda9b-2093-4b17-b2e8-c9fbc41c9cab" providerId="ADAL" clId="{D2CBAF8C-0DC0-434D-AC50-CC354D962A53}" dt="2019-11-01T12:14:48.887" v="13276" actId="1076"/>
       <pc:docMkLst>
         <pc:docMk/>
       </pc:docMkLst>
-      <pc:sldChg chg="modSp">
-        <pc:chgData name="Fabian Wosar" userId="f59eda9b-2093-4b17-b2e8-c9fbc41c9cab" providerId="ADAL" clId="{D2CBAF8C-0DC0-434D-AC50-CC354D962A53}" dt="2019-10-31T17:25:48.713" v="193" actId="20577"/>
+      <pc:sldChg chg="addSp modSp">
+        <pc:chgData name="Fabian Wosar" userId="f59eda9b-2093-4b17-b2e8-c9fbc41c9cab" providerId="ADAL" clId="{D2CBAF8C-0DC0-434D-AC50-CC354D962A53}" dt="2019-11-01T12:14:48.887" v="13276" actId="1076"/>
         <pc:sldMkLst>
           <pc:docMk/>
           <pc:sldMk cId="3798771929" sldId="256"/>
@@ -200,6 +200,14 @@
             <ac:spMk id="3" creationId="{18915AA8-A8A4-4B05-99EE-CC8B2D7EA426}"/>
           </ac:spMkLst>
         </pc:spChg>
+        <pc:picChg chg="add mod">
+          <ac:chgData name="Fabian Wosar" userId="f59eda9b-2093-4b17-b2e8-c9fbc41c9cab" providerId="ADAL" clId="{D2CBAF8C-0DC0-434D-AC50-CC354D962A53}" dt="2019-11-01T12:14:48.887" v="13276" actId="1076"/>
+          <ac:picMkLst>
+            <pc:docMk/>
+            <pc:sldMk cId="3798771929" sldId="256"/>
+            <ac:picMk id="7" creationId="{10F006E3-828B-402B-93CF-DDB5A4E103EB}"/>
+          </ac:picMkLst>
+        </pc:picChg>
       </pc:sldChg>
       <pc:sldChg chg="del">
         <pc:chgData name="Fabian Wosar" userId="f59eda9b-2093-4b17-b2e8-c9fbc41c9cab" providerId="ADAL" clId="{D2CBAF8C-0DC0-434D-AC50-CC354D962A53}" dt="2019-10-31T17:29:50.284" v="605" actId="2696"/>
@@ -5261,6 +5269,42 @@
           </a:p>
         </p:txBody>
       </p:sp>
+      <p:pic>
+        <p:nvPicPr>
+          <p:cNvPr id="7" name="Picture 6" descr="A close up of a sign&#10;&#10;Description automatically generated">
+            <a:extLst>
+              <a:ext uri="{FF2B5EF4-FFF2-40B4-BE49-F238E27FC236}">
+                <a16:creationId xmlns:a16="http://schemas.microsoft.com/office/drawing/2014/main" id="{10F006E3-828B-402B-93CF-DDB5A4E103EB}"/>
+              </a:ext>
+            </a:extLst>
+          </p:cNvPr>
+          <p:cNvPicPr>
+            <a:picLocks noChangeAspect="1"/>
+          </p:cNvPicPr>
+          <p:nvPr/>
+        </p:nvPicPr>
+        <p:blipFill>
+          <a:blip r:embed="rId3">
+            <a:extLst>
+              <a:ext uri="{28A0092B-C50C-407E-A947-70E740481C1C}">
+                <a14:useLocalDpi xmlns:a14="http://schemas.microsoft.com/office/drawing/2010/main" val="0"/>
+              </a:ext>
+            </a:extLst>
+          </a:blip>
+          <a:stretch>
+            <a:fillRect/>
+          </a:stretch>
+        </p:blipFill>
+        <p:spPr>
+          <a:xfrm>
+            <a:off x="9839878" y="4195621"/>
+            <a:ext cx="2352122" cy="2352122"/>
+          </a:xfrm>
+          <a:prstGeom prst="rect">
+            <a:avLst/>
+          </a:prstGeom>
+        </p:spPr>
+      </p:pic>
     </p:spTree>
     <p:extLst>
       <p:ext uri="{BB962C8B-B14F-4D97-AF65-F5344CB8AC3E}">
@@ -35872,21 +35916,12 @@
 </file>
 
 <file path=customXml/item1.xml><?xml version="1.0" encoding="utf-8"?>
-<?mso-contentType ?>
-<FormTemplates xmlns="http://schemas.microsoft.com/sharepoint/v3/contenttype/forms">
-  <Display>DocumentLibraryForm</Display>
-  <Edit>DocumentLibraryForm</Edit>
-  <New>DocumentLibraryForm</New>
-</FormTemplates>
-</file>
-
-<file path=customXml/item2.xml><?xml version="1.0" encoding="utf-8"?>
 <p:properties xmlns:p="http://schemas.microsoft.com/office/2006/metadata/properties" xmlns:xsi="http://www.w3.org/2001/XMLSchema-instance" xmlns:pc="http://schemas.microsoft.com/office/infopath/2007/PartnerControls">
   <documentManagement/>
 </p:properties>
 </file>
 
-<file path=customXml/item3.xml><?xml version="1.0" encoding="utf-8"?>
+<file path=customXml/item2.xml><?xml version="1.0" encoding="utf-8"?>
 <ct:contentTypeSchema xmlns:ct="http://schemas.microsoft.com/office/2006/metadata/contentType" xmlns:ma="http://schemas.microsoft.com/office/2006/metadata/properties/metaAttributes" ct:_="" ma:_="" ma:contentTypeName="Document" ma:contentTypeID="0x0101008251AA4E2B38C84FA150A2BBD6A00DAC" ma:contentTypeVersion="2" ma:contentTypeDescription="Create a new document." ma:contentTypeScope="" ma:versionID="dad994991844708e0d246ae4a584a4b8">
   <xsd:schema xmlns:xsd="http://www.w3.org/2001/XMLSchema" xmlns:xs="http://www.w3.org/2001/XMLSchema" xmlns:p="http://schemas.microsoft.com/office/2006/metadata/properties" xmlns:ns3="2fcacc2e-afce-4a15-8a2e-4adf7efc80f7" targetNamespace="http://schemas.microsoft.com/office/2006/metadata/properties" ma:root="true" ma:fieldsID="22a7ac8ea9023e74e066d3906c3f550b" ns3:_="">
     <xsd:import namespace="2fcacc2e-afce-4a15-8a2e-4adf7efc80f7"/>
@@ -36018,15 +36053,16 @@
 </ct:contentTypeSchema>
 </file>
 
-<file path=customXml/itemProps1.xml><?xml version="1.0" encoding="utf-8"?>
-<ds:datastoreItem xmlns:ds="http://schemas.openxmlformats.org/officeDocument/2006/customXml" ds:itemID="{B1297B32-2E73-48A3-8381-A3D9A9D2D610}">
-  <ds:schemaRefs>
-    <ds:schemaRef ds:uri="http://schemas.microsoft.com/sharepoint/v3/contenttype/forms"/>
-  </ds:schemaRefs>
-</ds:datastoreItem>
+<file path=customXml/item3.xml><?xml version="1.0" encoding="utf-8"?>
+<?mso-contentType ?>
+<FormTemplates xmlns="http://schemas.microsoft.com/sharepoint/v3/contenttype/forms">
+  <Display>DocumentLibraryForm</Display>
+  <Edit>DocumentLibraryForm</Edit>
+  <New>DocumentLibraryForm</New>
+</FormTemplates>
 </file>
 
-<file path=customXml/itemProps2.xml><?xml version="1.0" encoding="utf-8"?>
+<file path=customXml/itemProps1.xml><?xml version="1.0" encoding="utf-8"?>
 <ds:datastoreItem xmlns:ds="http://schemas.openxmlformats.org/officeDocument/2006/customXml" ds:itemID="{DCFE3EAC-34FF-4227-8FA5-D50B77269847}">
   <ds:schemaRefs>
     <ds:schemaRef ds:uri="http://schemas.microsoft.com/office/2006/metadata/properties"/>
@@ -36035,7 +36071,7 @@
 </ds:datastoreItem>
 </file>
 
-<file path=customXml/itemProps3.xml><?xml version="1.0" encoding="utf-8"?>
+<file path=customXml/itemProps2.xml><?xml version="1.0" encoding="utf-8"?>
 <ds:datastoreItem xmlns:ds="http://schemas.openxmlformats.org/officeDocument/2006/customXml" ds:itemID="{320D40A7-67A7-4910-945B-E771C366D8D0}">
   <ds:schemaRefs>
     <ds:schemaRef ds:uri="http://schemas.microsoft.com/office/2006/metadata/contentType"/>
@@ -36051,4 +36087,12 @@
     <ds:schemaRef ds:uri="http://schemas.microsoft.com/internal/obd"/>
   </ds:schemaRefs>
 </ds:datastoreItem>
+</file>
+
+<file path=customXml/itemProps3.xml><?xml version="1.0" encoding="utf-8"?>
+<ds:datastoreItem xmlns:ds="http://schemas.openxmlformats.org/officeDocument/2006/customXml" ds:itemID="{B1297B32-2E73-48A3-8381-A3D9A9D2D610}">
+  <ds:schemaRefs>
+    <ds:schemaRef ds:uri="http://schemas.microsoft.com/sharepoint/v3/contenttype/forms"/>
+  </ds:schemaRefs>
+</ds:datastoreItem>
 </file>
</xml_diff>